<commit_message>
Add corrections to lab
</commit_message>
<xml_diff>
--- a/06. Data Storage/Lab 6 - File Management and storage (RUS).pptx
+++ b/06. Data Storage/Lab 6 - File Management and storage (RUS).pptx
@@ -1066,7 +1066,7 @@
                   <a:spcPct val="0"/>
                 </a:spcAft>
               </a:pPr>
-              <a:t>12/7/2015 12:57 AM</a:t>
+              <a:t>12/7/2015 1:16 AM</a:t>
             </a:fld>
             <a:endParaRPr lang="en-US"/>
           </a:p>
@@ -45650,7 +45650,7 @@
         <p:spPr>
           <a:xfrm>
             <a:off x="269239" y="1189177"/>
-            <a:ext cx="5904733" cy="4106573"/>
+            <a:ext cx="5904733" cy="4649606"/>
           </a:xfrm>
         </p:spPr>
         <p:txBody>
@@ -45664,6 +45664,22 @@
             <a:r>
               <a:rPr lang="ru-RU" dirty="0" smtClean="0"/>
               <a:t>файла на отдельной странице</a:t>
+            </a:r>
+            <a:r>
+              <a:rPr lang="en-US" dirty="0"/>
+              <a:t> </a:t>
+            </a:r>
+            <a:r>
+              <a:rPr lang="en-US" dirty="0" smtClean="0"/>
+              <a:t>c </a:t>
+            </a:r>
+            <a:r>
+              <a:rPr lang="ru-RU" dirty="0" smtClean="0"/>
+              <a:t>помощью </a:t>
+            </a:r>
+            <a:r>
+              <a:rPr lang="en-US" smtClean="0"/>
+              <a:t>KnownFolders API</a:t>
             </a:r>
             <a:endParaRPr lang="ru-RU" dirty="0"/>
           </a:p>

</xml_diff>